<commit_message>
Versión 1.0 Página comercial
</commit_message>
<xml_diff>
--- a/web-commercial/design/design.pptx
+++ b/web-commercial/design/design.pptx
@@ -12,9 +12,10 @@
     <p:sldId id="260" r:id="rId6"/>
     <p:sldId id="261" r:id="rId7"/>
     <p:sldId id="265" r:id="rId8"/>
-    <p:sldId id="264" r:id="rId9"/>
-    <p:sldId id="262" r:id="rId10"/>
-    <p:sldId id="263" r:id="rId11"/>
+    <p:sldId id="266" r:id="rId9"/>
+    <p:sldId id="264" r:id="rId10"/>
+    <p:sldId id="262" r:id="rId11"/>
+    <p:sldId id="263" r:id="rId12"/>
   </p:sldIdLst>
   <p:sldSz cx="9144000" cy="6858000" type="screen4x3"/>
   <p:notesSz cx="6858000" cy="9144000"/>
@@ -313,7 +314,7 @@
           <a:p>
             <a:fld id="{7A847CFC-816F-41D0-AAC0-9BF4FEBC753E}" type="datetimeFigureOut">
               <a:rPr lang="es-ES" smtClean="0"/>
-              <a:t>01/05/2019</a:t>
+              <a:t>19/05/2019</a:t>
             </a:fld>
             <a:endParaRPr lang="es-ES"/>
           </a:p>
@@ -478,7 +479,7 @@
           <a:p>
             <a:fld id="{7A847CFC-816F-41D0-AAC0-9BF4FEBC753E}" type="datetimeFigureOut">
               <a:rPr lang="es-ES" smtClean="0"/>
-              <a:t>01/05/2019</a:t>
+              <a:t>19/05/2019</a:t>
             </a:fld>
             <a:endParaRPr lang="es-ES"/>
           </a:p>
@@ -653,7 +654,7 @@
           <a:p>
             <a:fld id="{7A847CFC-816F-41D0-AAC0-9BF4FEBC753E}" type="datetimeFigureOut">
               <a:rPr lang="es-ES" smtClean="0"/>
-              <a:t>01/05/2019</a:t>
+              <a:t>19/05/2019</a:t>
             </a:fld>
             <a:endParaRPr lang="es-ES"/>
           </a:p>
@@ -818,7 +819,7 @@
           <a:p>
             <a:fld id="{7A847CFC-816F-41D0-AAC0-9BF4FEBC753E}" type="datetimeFigureOut">
               <a:rPr lang="es-ES" smtClean="0"/>
-              <a:t>01/05/2019</a:t>
+              <a:t>19/05/2019</a:t>
             </a:fld>
             <a:endParaRPr lang="es-ES"/>
           </a:p>
@@ -1059,7 +1060,7 @@
           <a:p>
             <a:fld id="{7A847CFC-816F-41D0-AAC0-9BF4FEBC753E}" type="datetimeFigureOut">
               <a:rPr lang="es-ES" smtClean="0"/>
-              <a:t>01/05/2019</a:t>
+              <a:t>19/05/2019</a:t>
             </a:fld>
             <a:endParaRPr lang="es-ES"/>
           </a:p>
@@ -1342,7 +1343,7 @@
           <a:p>
             <a:fld id="{7A847CFC-816F-41D0-AAC0-9BF4FEBC753E}" type="datetimeFigureOut">
               <a:rPr lang="es-ES" smtClean="0"/>
-              <a:t>01/05/2019</a:t>
+              <a:t>19/05/2019</a:t>
             </a:fld>
             <a:endParaRPr lang="es-ES"/>
           </a:p>
@@ -1759,7 +1760,7 @@
           <a:p>
             <a:fld id="{7A847CFC-816F-41D0-AAC0-9BF4FEBC753E}" type="datetimeFigureOut">
               <a:rPr lang="es-ES" smtClean="0"/>
-              <a:t>01/05/2019</a:t>
+              <a:t>19/05/2019</a:t>
             </a:fld>
             <a:endParaRPr lang="es-ES"/>
           </a:p>
@@ -1872,7 +1873,7 @@
           <a:p>
             <a:fld id="{7A847CFC-816F-41D0-AAC0-9BF4FEBC753E}" type="datetimeFigureOut">
               <a:rPr lang="es-ES" smtClean="0"/>
-              <a:t>01/05/2019</a:t>
+              <a:t>19/05/2019</a:t>
             </a:fld>
             <a:endParaRPr lang="es-ES"/>
           </a:p>
@@ -1962,7 +1963,7 @@
           <a:p>
             <a:fld id="{7A847CFC-816F-41D0-AAC0-9BF4FEBC753E}" type="datetimeFigureOut">
               <a:rPr lang="es-ES" smtClean="0"/>
-              <a:t>01/05/2019</a:t>
+              <a:t>19/05/2019</a:t>
             </a:fld>
             <a:endParaRPr lang="es-ES"/>
           </a:p>
@@ -2234,7 +2235,7 @@
           <a:p>
             <a:fld id="{7A847CFC-816F-41D0-AAC0-9BF4FEBC753E}" type="datetimeFigureOut">
               <a:rPr lang="es-ES" smtClean="0"/>
-              <a:t>01/05/2019</a:t>
+              <a:t>19/05/2019</a:t>
             </a:fld>
             <a:endParaRPr lang="es-ES"/>
           </a:p>
@@ -2482,7 +2483,7 @@
           <a:p>
             <a:fld id="{7A847CFC-816F-41D0-AAC0-9BF4FEBC753E}" type="datetimeFigureOut">
               <a:rPr lang="es-ES" smtClean="0"/>
-              <a:t>01/05/2019</a:t>
+              <a:t>19/05/2019</a:t>
             </a:fld>
             <a:endParaRPr lang="es-ES"/>
           </a:p>
@@ -2690,7 +2691,7 @@
           <a:p>
             <a:fld id="{7A847CFC-816F-41D0-AAC0-9BF4FEBC753E}" type="datetimeFigureOut">
               <a:rPr lang="es-ES" smtClean="0"/>
-              <a:t>01/05/2019</a:t>
+              <a:t>19/05/2019</a:t>
             </a:fld>
             <a:endParaRPr lang="es-ES"/>
           </a:p>
@@ -6586,6 +6587,222 @@
           </a:extLst>
         </p:spPr>
       </p:pic>
+      <p:pic>
+        <p:nvPicPr>
+          <p:cNvPr id="3" name="Imagen 2"/>
+          <p:cNvPicPr>
+            <a:picLocks noChangeAspect="1"/>
+          </p:cNvPicPr>
+          <p:nvPr/>
+        </p:nvPicPr>
+        <p:blipFill>
+          <a:blip r:embed="rId3"/>
+          <a:stretch>
+            <a:fillRect/>
+          </a:stretch>
+        </p:blipFill>
+        <p:spPr>
+          <a:xfrm>
+            <a:off x="3419872" y="4509120"/>
+            <a:ext cx="1368152" cy="640295"/>
+          </a:xfrm>
+          <a:prstGeom prst="rect">
+            <a:avLst/>
+          </a:prstGeom>
+        </p:spPr>
+      </p:pic>
+    </p:spTree>
+    <p:extLst>
+      <p:ext uri="{BB962C8B-B14F-4D97-AF65-F5344CB8AC3E}">
+        <p14:creationId xmlns:p14="http://schemas.microsoft.com/office/powerpoint/2010/main" val="2838647859"/>
+      </p:ext>
+    </p:extLst>
+  </p:cSld>
+  <p:clrMapOvr>
+    <a:masterClrMapping/>
+  </p:clrMapOvr>
+  <p:timing>
+    <p:tnLst>
+      <p:par>
+        <p:cTn id="1" dur="indefinite" restart="never" nodeType="tmRoot"/>
+      </p:par>
+    </p:tnLst>
+  </p:timing>
+</p:sld>
+</file>
+
+<file path=ppt/slides/slide11.xml><?xml version="1.0" encoding="utf-8"?>
+<p:sld xmlns:a="http://schemas.openxmlformats.org/drawingml/2006/main" xmlns:r="http://schemas.openxmlformats.org/officeDocument/2006/relationships" xmlns:p="http://schemas.openxmlformats.org/presentationml/2006/main">
+  <p:cSld>
+    <p:spTree>
+      <p:nvGrpSpPr>
+        <p:cNvPr id="1" name=""/>
+        <p:cNvGrpSpPr/>
+        <p:nvPr/>
+      </p:nvGrpSpPr>
+      <p:grpSpPr>
+        <a:xfrm>
+          <a:off x="0" y="0"/>
+          <a:ext cx="0" cy="0"/>
+          <a:chOff x="0" y="0"/>
+          <a:chExt cx="0" cy="0"/>
+        </a:xfrm>
+      </p:grpSpPr>
+      <p:sp>
+        <p:nvSpPr>
+          <p:cNvPr id="6" name="CuadroTexto 5"/>
+          <p:cNvSpPr txBox="1"/>
+          <p:nvPr/>
+        </p:nvSpPr>
+        <p:spPr>
+          <a:xfrm>
+            <a:off x="1043608" y="2564904"/>
+            <a:ext cx="6624736" cy="2646878"/>
+          </a:xfrm>
+          <a:prstGeom prst="rect">
+            <a:avLst/>
+          </a:prstGeom>
+          <a:noFill/>
+        </p:spPr>
+        <p:txBody>
+          <a:bodyPr wrap="square" rtlCol="0">
+            <a:spAutoFit/>
+          </a:bodyPr>
+          <a:lstStyle/>
+          <a:p>
+            <a:r>
+              <a:rPr lang="es-ES" sz="16600" dirty="0" err="1">
+                <a:solidFill>
+                  <a:schemeClr val="bg1">
+                    <a:lumMod val="50000"/>
+                  </a:schemeClr>
+                </a:solidFill>
+                <a:latin typeface="Tovari Sans" pitchFamily="2" charset="0"/>
+                <a:ea typeface="Tovari Sans" pitchFamily="2" charset="0"/>
+              </a:rPr>
+              <a:t>t</a:t>
+            </a:r>
+            <a:r>
+              <a:rPr lang="es-ES" sz="16600" dirty="0" err="1" smtClean="0">
+                <a:solidFill>
+                  <a:schemeClr val="bg1">
+                    <a:lumMod val="50000"/>
+                  </a:schemeClr>
+                </a:solidFill>
+                <a:latin typeface="Tovari Sans" pitchFamily="2" charset="0"/>
+                <a:ea typeface="Tovari Sans" pitchFamily="2" charset="0"/>
+              </a:rPr>
+              <a:t>as</a:t>
+            </a:r>
+            <a:r>
+              <a:rPr lang="es-ES" sz="16600" dirty="0" err="1" smtClean="0">
+                <a:solidFill>
+                  <a:srgbClr val="FF9900"/>
+                </a:solidFill>
+                <a:latin typeface="Tovari Sans" pitchFamily="2" charset="0"/>
+                <a:ea typeface="Tovari Sans" pitchFamily="2" charset="0"/>
+              </a:rPr>
+              <a:t>K</a:t>
+            </a:r>
+            <a:r>
+              <a:rPr lang="es-ES" sz="16600" dirty="0" err="1" smtClean="0">
+                <a:solidFill>
+                  <a:schemeClr val="bg1">
+                    <a:lumMod val="50000"/>
+                  </a:schemeClr>
+                </a:solidFill>
+                <a:latin typeface="Tovari Sans" pitchFamily="2" charset="0"/>
+                <a:ea typeface="Tovari Sans" pitchFamily="2" charset="0"/>
+              </a:rPr>
+              <a:t>er</a:t>
+            </a:r>
+            <a:endParaRPr lang="en-US" sz="16600" dirty="0">
+              <a:solidFill>
+                <a:schemeClr val="bg1">
+                  <a:lumMod val="50000"/>
+                </a:schemeClr>
+              </a:solidFill>
+              <a:latin typeface="Tovari Sans" pitchFamily="2" charset="0"/>
+              <a:ea typeface="Tovari Sans" pitchFamily="2" charset="0"/>
+            </a:endParaRPr>
+          </a:p>
+        </p:txBody>
+      </p:sp>
+      <p:sp>
+        <p:nvSpPr>
+          <p:cNvPr id="5" name="CuadroTexto 4"/>
+          <p:cNvSpPr txBox="1"/>
+          <p:nvPr/>
+        </p:nvSpPr>
+        <p:spPr>
+          <a:xfrm>
+            <a:off x="971600" y="404664"/>
+            <a:ext cx="6624736" cy="2646878"/>
+          </a:xfrm>
+          <a:prstGeom prst="rect">
+            <a:avLst/>
+          </a:prstGeom>
+          <a:noFill/>
+        </p:spPr>
+        <p:txBody>
+          <a:bodyPr wrap="square" rtlCol="0">
+            <a:spAutoFit/>
+          </a:bodyPr>
+          <a:lstStyle/>
+          <a:p>
+            <a:r>
+              <a:rPr lang="es-ES" sz="16600" dirty="0" smtClean="0">
+                <a:ea typeface="Tovari Sans" pitchFamily="2" charset="0"/>
+              </a:rPr>
+              <a:t>Tasker</a:t>
+            </a:r>
+            <a:endParaRPr lang="en-US" sz="16600" dirty="0">
+              <a:ea typeface="Tovari Sans" pitchFamily="2" charset="0"/>
+            </a:endParaRPr>
+          </a:p>
+        </p:txBody>
+      </p:sp>
+      <p:pic>
+        <p:nvPicPr>
+          <p:cNvPr id="3078" name="Picture 6" descr="https://encrypted-tbn0.gstatic.com/images?q=tbn:ANd9GcS_iqalxxe2NoV6LKFpKX1D5alF-UpPhllSX_-NLXKEHyzoJhFu"/>
+          <p:cNvPicPr>
+            <a:picLocks noChangeAspect="1" noChangeArrowheads="1"/>
+          </p:cNvPicPr>
+          <p:nvPr/>
+        </p:nvPicPr>
+        <p:blipFill>
+          <a:blip r:embed="rId2">
+            <a:extLst>
+              <a:ext uri="{28A0092B-C50C-407E-A947-70E740481C1C}">
+                <a14:useLocalDpi xmlns:a14="http://schemas.microsoft.com/office/drawing/2010/main" val="0"/>
+              </a:ext>
+            </a:extLst>
+          </a:blip>
+          <a:srcRect/>
+          <a:stretch>
+            <a:fillRect/>
+          </a:stretch>
+        </p:blipFill>
+        <p:spPr bwMode="auto">
+          <a:xfrm>
+            <a:off x="155575" y="-1028700"/>
+            <a:ext cx="2143125" cy="2143125"/>
+          </a:xfrm>
+          <a:prstGeom prst="rect">
+            <a:avLst/>
+          </a:prstGeom>
+          <a:noFill/>
+          <a:extLst>
+            <a:ext uri="{909E8E84-426E-40DD-AFC4-6F175D3DCCD1}">
+              <a14:hiddenFill xmlns:a14="http://schemas.microsoft.com/office/drawing/2010/main">
+                <a:solidFill>
+                  <a:srgbClr val="FFFFFF"/>
+                </a:solidFill>
+              </a14:hiddenFill>
+            </a:ext>
+          </a:extLst>
+        </p:spPr>
+      </p:pic>
     </p:spTree>
     <p:extLst>
       <p:ext uri="{BB962C8B-B14F-4D97-AF65-F5344CB8AC3E}">
@@ -8598,7 +8815,7 @@
         <p:spPr>
           <a:xfrm>
             <a:off x="0" y="1484784"/>
-            <a:ext cx="1853782" cy="830997"/>
+            <a:ext cx="1853782" cy="276999"/>
           </a:xfrm>
           <a:prstGeom prst="rect">
             <a:avLst/>
@@ -8612,10 +8829,6 @@
           <a:lstStyle/>
           <a:p>
             <a:pPr algn="ctr"/>
-            <a:r>
-              <a:rPr lang="es-US" sz="1200" dirty="0" smtClean="0"/>
-              <a:t>Porque verificamos la procedencia,  legalidad y experiencia de los solucionadores</a:t>
-            </a:r>
             <a:endParaRPr lang="es-US" sz="1200" dirty="0"/>
           </a:p>
         </p:txBody>
@@ -8697,7 +8910,7 @@
         <p:spPr>
           <a:xfrm>
             <a:off x="-1181404" y="3061113"/>
-            <a:ext cx="2727599" cy="1015663"/>
+            <a:ext cx="2727599" cy="276999"/>
           </a:xfrm>
           <a:prstGeom prst="rect">
             <a:avLst/>
@@ -8710,14 +8923,6 @@
           </a:bodyPr>
           <a:lstStyle/>
           <a:p>
-            <a:r>
-              <a:rPr lang="es-CO" sz="1200" b="1" dirty="0" smtClean="0">
-                <a:solidFill>
-                  <a:srgbClr val="FF0000"/>
-                </a:solidFill>
-              </a:rPr>
-              <a:t>Porque puedes encontrar solucionadores para casi cualquier tipo de necesidad desde una tarea de matemáticas hasta  una asesoría jurídica</a:t>
-            </a:r>
             <a:endParaRPr lang="es-CO" sz="1200" b="1" dirty="0">
               <a:solidFill>
                 <a:srgbClr val="FF0000"/>
@@ -9017,6 +9222,77 @@
           </a:p>
         </p:txBody>
       </p:sp>
+      <p:pic>
+        <p:nvPicPr>
+          <p:cNvPr id="1026" name="Picture 2" descr="https://stepbystepusa.com/wp-content/uploads/2018/04/cropped-Step-By-Step-Logo.png"/>
+          <p:cNvPicPr>
+            <a:picLocks noChangeAspect="1" noChangeArrowheads="1"/>
+          </p:cNvPicPr>
+          <p:nvPr/>
+        </p:nvPicPr>
+        <p:blipFill>
+          <a:blip r:embed="rId2">
+            <a:extLst>
+              <a:ext uri="{28A0092B-C50C-407E-A947-70E740481C1C}">
+                <a14:useLocalDpi xmlns:a14="http://schemas.microsoft.com/office/drawing/2010/main" val="0"/>
+              </a:ext>
+            </a:extLst>
+          </a:blip>
+          <a:srcRect/>
+          <a:stretch>
+            <a:fillRect/>
+          </a:stretch>
+        </p:blipFill>
+        <p:spPr bwMode="auto">
+          <a:xfrm>
+            <a:off x="155575" y="-2338388"/>
+            <a:ext cx="4876800" cy="4876801"/>
+          </a:xfrm>
+          <a:prstGeom prst="rect">
+            <a:avLst/>
+          </a:prstGeom>
+          <a:noFill/>
+          <a:extLst>
+            <a:ext uri="{909E8E84-426E-40DD-AFC4-6F175D3DCCD1}">
+              <a14:hiddenFill xmlns:a14="http://schemas.microsoft.com/office/drawing/2010/main">
+                <a:solidFill>
+                  <a:srgbClr val="FFFFFF"/>
+                </a:solidFill>
+              </a14:hiddenFill>
+            </a:ext>
+          </a:extLst>
+        </p:spPr>
+      </p:pic>
+      <p:pic>
+        <p:nvPicPr>
+          <p:cNvPr id="2" name="Imagen 1"/>
+          <p:cNvPicPr>
+            <a:picLocks noChangeAspect="1"/>
+          </p:cNvPicPr>
+          <p:nvPr/>
+        </p:nvPicPr>
+        <p:blipFill>
+          <a:blip r:embed="rId3" cstate="print">
+            <a:extLst>
+              <a:ext uri="{28A0092B-C50C-407E-A947-70E740481C1C}">
+                <a14:useLocalDpi xmlns:a14="http://schemas.microsoft.com/office/drawing/2010/main" val="0"/>
+              </a:ext>
+            </a:extLst>
+          </a:blip>
+          <a:stretch>
+            <a:fillRect/>
+          </a:stretch>
+        </p:blipFill>
+        <p:spPr>
+          <a:xfrm>
+            <a:off x="0" y="857250"/>
+            <a:ext cx="9144000" cy="5143500"/>
+          </a:xfrm>
+          <a:prstGeom prst="rect">
+            <a:avLst/>
+          </a:prstGeom>
+        </p:spPr>
+      </p:pic>
     </p:spTree>
     <p:extLst>
       <p:ext uri="{BB962C8B-B14F-4D97-AF65-F5344CB8AC3E}">
@@ -9193,19 +9469,7 @@
                 <a:latin typeface="Tovari Sans" pitchFamily="2" charset="0"/>
                 <a:ea typeface="Tovari Sans" pitchFamily="2" charset="0"/>
               </a:rPr>
-              <a:t>t</a:t>
-            </a:r>
-            <a:r>
-              <a:rPr lang="es-ES" sz="16600" dirty="0" err="1" smtClean="0">
-                <a:solidFill>
-                  <a:schemeClr val="bg1">
-                    <a:lumMod val="85000"/>
-                  </a:schemeClr>
-                </a:solidFill>
-                <a:latin typeface="Tovari Sans" pitchFamily="2" charset="0"/>
-                <a:ea typeface="Tovari Sans" pitchFamily="2" charset="0"/>
-              </a:rPr>
-              <a:t>as</a:t>
+              <a:t>tas</a:t>
             </a:r>
             <a:r>
               <a:rPr lang="es-ES" sz="16600" dirty="0" err="1" smtClean="0">
@@ -9415,17 +9679,7 @@
                 <a:latin typeface="Tovari Sans" pitchFamily="2" charset="0"/>
                 <a:ea typeface="Tovari Sans" pitchFamily="2" charset="0"/>
               </a:rPr>
-              <a:t>t</a:t>
-            </a:r>
-            <a:r>
-              <a:rPr lang="es-ES" sz="16600" dirty="0" smtClean="0">
-                <a:solidFill>
-                  <a:schemeClr val="bg1"/>
-                </a:solidFill>
-                <a:latin typeface="Tovari Sans" pitchFamily="2" charset="0"/>
-                <a:ea typeface="Tovari Sans" pitchFamily="2" charset="0"/>
-              </a:rPr>
-              <a:t>as</a:t>
+              <a:t>tas</a:t>
             </a:r>
             <a:r>
               <a:rPr lang="es-ES" sz="16600" dirty="0">
@@ -9504,6 +9758,14 @@
 <file path=ppt/slides/slide8.xml><?xml version="1.0" encoding="utf-8"?>
 <p:sld xmlns:a="http://schemas.openxmlformats.org/drawingml/2006/main" xmlns:r="http://schemas.openxmlformats.org/officeDocument/2006/relationships" xmlns:p="http://schemas.openxmlformats.org/presentationml/2006/main">
   <p:cSld>
+    <p:bg>
+      <p:bgPr>
+        <a:solidFill>
+          <a:schemeClr val="tx1"/>
+        </a:solidFill>
+        <a:effectLst/>
+      </p:bgPr>
+    </p:bg>
     <p:spTree>
       <p:nvGrpSpPr>
         <p:cNvPr id="1" name=""/>
@@ -9526,7 +9788,7 @@
         </p:nvSpPr>
         <p:spPr>
           <a:xfrm>
-            <a:off x="1115616" y="2924944"/>
+            <a:off x="1691680" y="2060848"/>
             <a:ext cx="6624736" cy="2646878"/>
           </a:xfrm>
           <a:prstGeom prst="rect">
@@ -9543,18 +9805,36 @@
             <a:r>
               <a:rPr lang="es-ES" sz="16600" dirty="0" smtClean="0">
                 <a:solidFill>
-                  <a:srgbClr val="FF9900"/>
+                  <a:schemeClr val="bg1"/>
                 </a:solidFill>
                 <a:latin typeface="Tovari Sans" pitchFamily="2" charset="0"/>
                 <a:ea typeface="Tovari Sans" pitchFamily="2" charset="0"/>
               </a:rPr>
-              <a:t>K</a:t>
+              <a:t>tas</a:t>
+            </a:r>
+            <a:r>
+              <a:rPr lang="es-ES" sz="16600" dirty="0">
+                <a:solidFill>
+                  <a:srgbClr val="00B0F0"/>
+                </a:solidFill>
+                <a:latin typeface="Tovari Sans" pitchFamily="2" charset="0"/>
+                <a:ea typeface="Tovari Sans" pitchFamily="2" charset="0"/>
+              </a:rPr>
+              <a:t>k</a:t>
+            </a:r>
+            <a:r>
+              <a:rPr lang="es-ES" sz="16600" dirty="0" smtClean="0">
+                <a:solidFill>
+                  <a:schemeClr val="bg1"/>
+                </a:solidFill>
+                <a:latin typeface="Tovari Sans" pitchFamily="2" charset="0"/>
+                <a:ea typeface="Tovari Sans" pitchFamily="2" charset="0"/>
+              </a:rPr>
+              <a:t>er</a:t>
             </a:r>
             <a:endParaRPr lang="en-US" sz="16600" dirty="0">
               <a:solidFill>
-                <a:schemeClr val="bg1">
-                  <a:lumMod val="85000"/>
-                </a:schemeClr>
+                <a:schemeClr val="bg1"/>
               </a:solidFill>
               <a:latin typeface="Tovari Sans" pitchFamily="2" charset="0"/>
               <a:ea typeface="Tovari Sans" pitchFamily="2" charset="0"/>
@@ -9562,81 +9842,6 @@
           </a:p>
         </p:txBody>
       </p:sp>
-      <p:sp>
-        <p:nvSpPr>
-          <p:cNvPr id="5" name="CuadroTexto 4"/>
-          <p:cNvSpPr txBox="1"/>
-          <p:nvPr/>
-        </p:nvSpPr>
-        <p:spPr>
-          <a:xfrm>
-            <a:off x="971600" y="404664"/>
-            <a:ext cx="6624736" cy="2646878"/>
-          </a:xfrm>
-          <a:prstGeom prst="rect">
-            <a:avLst/>
-          </a:prstGeom>
-          <a:noFill/>
-        </p:spPr>
-        <p:txBody>
-          <a:bodyPr wrap="square" rtlCol="0">
-            <a:spAutoFit/>
-          </a:bodyPr>
-          <a:lstStyle/>
-          <a:p>
-            <a:r>
-              <a:rPr lang="es-ES" sz="16600" dirty="0" smtClean="0">
-                <a:ea typeface="Tovari Sans" pitchFamily="2" charset="0"/>
-              </a:rPr>
-              <a:t>Tasker</a:t>
-            </a:r>
-            <a:endParaRPr lang="en-US" sz="16600" dirty="0">
-              <a:ea typeface="Tovari Sans" pitchFamily="2" charset="0"/>
-            </a:endParaRPr>
-          </a:p>
-        </p:txBody>
-      </p:sp>
-      <p:pic>
-        <p:nvPicPr>
-          <p:cNvPr id="3078" name="Picture 6" descr="https://encrypted-tbn0.gstatic.com/images?q=tbn:ANd9GcS_iqalxxe2NoV6LKFpKX1D5alF-UpPhllSX_-NLXKEHyzoJhFu"/>
-          <p:cNvPicPr>
-            <a:picLocks noChangeAspect="1" noChangeArrowheads="1"/>
-          </p:cNvPicPr>
-          <p:nvPr/>
-        </p:nvPicPr>
-        <p:blipFill>
-          <a:blip r:embed="rId2">
-            <a:extLst>
-              <a:ext uri="{28A0092B-C50C-407E-A947-70E740481C1C}">
-                <a14:useLocalDpi xmlns:a14="http://schemas.microsoft.com/office/drawing/2010/main" val="0"/>
-              </a:ext>
-            </a:extLst>
-          </a:blip>
-          <a:srcRect/>
-          <a:stretch>
-            <a:fillRect/>
-          </a:stretch>
-        </p:blipFill>
-        <p:spPr bwMode="auto">
-          <a:xfrm>
-            <a:off x="155575" y="-1028700"/>
-            <a:ext cx="2143125" cy="2143125"/>
-          </a:xfrm>
-          <a:prstGeom prst="rect">
-            <a:avLst/>
-          </a:prstGeom>
-          <a:noFill/>
-          <a:extLst>
-            <a:ext uri="{909E8E84-426E-40DD-AFC4-6F175D3DCCD1}">
-              <a14:hiddenFill xmlns:a14="http://schemas.microsoft.com/office/drawing/2010/main">
-                <a:solidFill>
-                  <a:srgbClr val="FFFFFF"/>
-                </a:solidFill>
-              </a14:hiddenFill>
-            </a:ext>
-          </a:extLst>
-        </p:spPr>
-      </p:pic>
       <p:pic>
         <p:nvPicPr>
           <p:cNvPr id="2" name="Imagen 1"/>
@@ -9646,39 +9851,15 @@
           <p:nvPr/>
         </p:nvPicPr>
         <p:blipFill>
-          <a:blip r:embed="rId3"/>
+          <a:blip r:embed="rId2"/>
           <a:stretch>
             <a:fillRect/>
           </a:stretch>
         </p:blipFill>
         <p:spPr>
           <a:xfrm>
-            <a:off x="1259632" y="4869160"/>
-            <a:ext cx="1018752" cy="355950"/>
-          </a:xfrm>
-          <a:prstGeom prst="rect">
-            <a:avLst/>
-          </a:prstGeom>
-        </p:spPr>
-      </p:pic>
-      <p:pic>
-        <p:nvPicPr>
-          <p:cNvPr id="3" name="Imagen 2"/>
-          <p:cNvPicPr>
-            <a:picLocks noChangeAspect="1"/>
-          </p:cNvPicPr>
-          <p:nvPr/>
-        </p:nvPicPr>
-        <p:blipFill>
-          <a:blip r:embed="rId4"/>
-          <a:stretch>
-            <a:fillRect/>
-          </a:stretch>
-        </p:blipFill>
-        <p:spPr>
-          <a:xfrm>
-            <a:off x="4050350" y="2658799"/>
-            <a:ext cx="1043300" cy="1540402"/>
+            <a:off x="4283968" y="4063191"/>
+            <a:ext cx="864096" cy="301913"/>
           </a:xfrm>
           <a:prstGeom prst="rect">
             <a:avLst/>
@@ -9688,7 +9869,7 @@
     </p:spTree>
     <p:extLst>
       <p:ext uri="{BB962C8B-B14F-4D97-AF65-F5344CB8AC3E}">
-        <p14:creationId xmlns:p14="http://schemas.microsoft.com/office/powerpoint/2010/main" val="3469065864"/>
+        <p14:creationId xmlns:p14="http://schemas.microsoft.com/office/powerpoint/2010/main" val="2333487560"/>
       </p:ext>
     </p:extLst>
   </p:cSld>
@@ -9730,7 +9911,7 @@
         </p:nvSpPr>
         <p:spPr>
           <a:xfrm>
-            <a:off x="1043608" y="2564904"/>
+            <a:off x="1115616" y="2924944"/>
             <a:ext cx="6624736" cy="2646878"/>
           </a:xfrm>
           <a:prstGeom prst="rect">
@@ -9745,31 +9926,7 @@
           <a:lstStyle/>
           <a:p>
             <a:r>
-              <a:rPr lang="es-ES" sz="16600" dirty="0" err="1">
-                <a:solidFill>
-                  <a:schemeClr val="bg1">
-                    <a:lumMod val="50000"/>
-                  </a:schemeClr>
-                </a:solidFill>
-                <a:latin typeface="Tovari Sans" pitchFamily="2" charset="0"/>
-                <a:ea typeface="Tovari Sans" pitchFamily="2" charset="0"/>
-              </a:rPr>
-              <a:t>t</a:t>
-            </a:r>
-            <a:r>
-              <a:rPr lang="es-ES" sz="16600" dirty="0" err="1" smtClean="0">
-                <a:solidFill>
-                  <a:schemeClr val="bg1">
-                    <a:lumMod val="50000"/>
-                  </a:schemeClr>
-                </a:solidFill>
-                <a:latin typeface="Tovari Sans" pitchFamily="2" charset="0"/>
-                <a:ea typeface="Tovari Sans" pitchFamily="2" charset="0"/>
-              </a:rPr>
-              <a:t>as</a:t>
-            </a:r>
-            <a:r>
-              <a:rPr lang="es-ES" sz="16600" dirty="0" err="1" smtClean="0">
+              <a:rPr lang="es-ES" sz="16600" dirty="0" smtClean="0">
                 <a:solidFill>
                   <a:srgbClr val="FF9900"/>
                 </a:solidFill>
@@ -9778,22 +9935,10 @@
               </a:rPr>
               <a:t>K</a:t>
             </a:r>
-            <a:r>
-              <a:rPr lang="es-ES" sz="16600" dirty="0" err="1" smtClean="0">
-                <a:solidFill>
-                  <a:schemeClr val="bg1">
-                    <a:lumMod val="50000"/>
-                  </a:schemeClr>
-                </a:solidFill>
-                <a:latin typeface="Tovari Sans" pitchFamily="2" charset="0"/>
-                <a:ea typeface="Tovari Sans" pitchFamily="2" charset="0"/>
-              </a:rPr>
-              <a:t>er</a:t>
-            </a:r>
             <a:endParaRPr lang="en-US" sz="16600" dirty="0">
               <a:solidFill>
                 <a:schemeClr val="bg1">
-                  <a:lumMod val="50000"/>
+                  <a:lumMod val="85000"/>
                 </a:schemeClr>
               </a:solidFill>
               <a:latin typeface="Tovari Sans" pitchFamily="2" charset="0"/>
@@ -9879,7 +10024,7 @@
       </p:pic>
       <p:pic>
         <p:nvPicPr>
-          <p:cNvPr id="3" name="Imagen 2"/>
+          <p:cNvPr id="2" name="Imagen 1"/>
           <p:cNvPicPr>
             <a:picLocks noChangeAspect="1"/>
           </p:cNvPicPr>
@@ -9893,8 +10038,32 @@
         </p:blipFill>
         <p:spPr>
           <a:xfrm>
-            <a:off x="3419872" y="4509120"/>
-            <a:ext cx="1368152" cy="640295"/>
+            <a:off x="1259632" y="4869160"/>
+            <a:ext cx="1018752" cy="355950"/>
+          </a:xfrm>
+          <a:prstGeom prst="rect">
+            <a:avLst/>
+          </a:prstGeom>
+        </p:spPr>
+      </p:pic>
+      <p:pic>
+        <p:nvPicPr>
+          <p:cNvPr id="3" name="Imagen 2"/>
+          <p:cNvPicPr>
+            <a:picLocks noChangeAspect="1"/>
+          </p:cNvPicPr>
+          <p:nvPr/>
+        </p:nvPicPr>
+        <p:blipFill>
+          <a:blip r:embed="rId4"/>
+          <a:stretch>
+            <a:fillRect/>
+          </a:stretch>
+        </p:blipFill>
+        <p:spPr>
+          <a:xfrm>
+            <a:off x="4050350" y="2658799"/>
+            <a:ext cx="1043300" cy="1540402"/>
           </a:xfrm>
           <a:prstGeom prst="rect">
             <a:avLst/>
@@ -9904,7 +10073,7 @@
     </p:spTree>
     <p:extLst>
       <p:ext uri="{BB962C8B-B14F-4D97-AF65-F5344CB8AC3E}">
-        <p14:creationId xmlns:p14="http://schemas.microsoft.com/office/powerpoint/2010/main" val="2838647859"/>
+        <p14:creationId xmlns:p14="http://schemas.microsoft.com/office/powerpoint/2010/main" val="3469065864"/>
       </p:ext>
     </p:extLst>
   </p:cSld>

</xml_diff>